<commit_message>
Deployed 8b2e395 with MkDocs version: 1.1.2
</commit_message>
<xml_diff>
--- a/presentations/GST-workshop-2021.pptx
+++ b/presentations/GST-workshop-2021.pptx
@@ -32908,6 +32908,9 @@
           <a:prstGeom prst="ellipse">
             <a:avLst/>
           </a:prstGeom>
+          <a:solidFill>
+            <a:srgbClr val="C00000"/>
+          </a:solidFill>
           <a:ln w="38100">
             <a:solidFill>
               <a:schemeClr val="tx1"/>
@@ -32936,7 +32939,11 @@
           <a:p>
             <a:pPr algn="ctr"/>
             <a:r>
-              <a:rPr lang="en-US" dirty="0"/>
+              <a:rPr lang="en-US" sz="2800" dirty="0">
+                <a:solidFill>
+                  <a:schemeClr val="bg1"/>
+                </a:solidFill>
+              </a:rPr>
               <a:t>Data</a:t>
             </a:r>
           </a:p>
@@ -32956,12 +32963,15 @@
         </p:nvSpPr>
         <p:spPr>
           <a:xfrm>
-            <a:off x="4304669" y="3793723"/>
-            <a:ext cx="2144258" cy="692495"/>
+            <a:off x="4153358" y="3793723"/>
+            <a:ext cx="2445745" cy="692495"/>
           </a:xfrm>
           <a:prstGeom prst="ellipse">
             <a:avLst/>
           </a:prstGeom>
+          <a:solidFill>
+            <a:schemeClr val="accent4"/>
+          </a:solidFill>
           <a:ln w="38100">
             <a:solidFill>
               <a:schemeClr val="tx1"/>
@@ -32990,7 +33000,11 @@
           <a:p>
             <a:pPr algn="ctr"/>
             <a:r>
-              <a:rPr lang="en-US" dirty="0"/>
+              <a:rPr lang="en-US" sz="2800" dirty="0">
+                <a:solidFill>
+                  <a:schemeClr val="tx1"/>
+                </a:solidFill>
+              </a:rPr>
               <a:t>Prediction</a:t>
             </a:r>
           </a:p>
@@ -33015,7 +33029,7 @@
         <p:spPr>
           <a:xfrm>
             <a:off x="6346026" y="2196165"/>
-            <a:ext cx="1491505" cy="735303"/>
+            <a:ext cx="1491505" cy="614062"/>
           </a:xfrm>
           <a:prstGeom prst="curvedConnector2">
             <a:avLst/>
@@ -33056,12 +33070,15 @@
         </p:nvSpPr>
         <p:spPr>
           <a:xfrm>
-            <a:off x="7481950" y="2831035"/>
-            <a:ext cx="2428061" cy="685800"/>
+            <a:off x="7481950" y="2644048"/>
+            <a:ext cx="2428061" cy="1134738"/>
           </a:xfrm>
           <a:prstGeom prst="ellipse">
             <a:avLst/>
           </a:prstGeom>
+          <a:solidFill>
+            <a:schemeClr val="accent2"/>
+          </a:solidFill>
           <a:ln w="38100">
             <a:solidFill>
               <a:schemeClr val="tx1"/>
@@ -33090,8 +33107,8 @@
           <a:p>
             <a:pPr algn="ctr"/>
             <a:r>
-              <a:rPr lang="en-US" dirty="0"/>
-              <a:t>Machine Learning Model</a:t>
+              <a:rPr lang="en-US" sz="2800" dirty="0"/>
+              <a:t>ML Model</a:t>
             </a:r>
           </a:p>
         </p:txBody>
@@ -33116,6 +33133,11 @@
           <a:prstGeom prst="ellipse">
             <a:avLst/>
           </a:prstGeom>
+          <a:solidFill>
+            <a:schemeClr val="accent6">
+              <a:lumMod val="75000"/>
+            </a:schemeClr>
+          </a:solidFill>
           <a:ln w="38100">
             <a:solidFill>
               <a:schemeClr val="tx1"/>
@@ -33144,7 +33166,7 @@
           <a:p>
             <a:pPr algn="ctr"/>
             <a:r>
-              <a:rPr lang="en-US" dirty="0"/>
+              <a:rPr lang="en-US" sz="2800" dirty="0"/>
               <a:t>Feedback</a:t>
             </a:r>
           </a:p>
@@ -33203,8 +33225,8 @@
         </p:nvCxnSpPr>
         <p:spPr>
           <a:xfrm rot="5400000">
-            <a:off x="6781445" y="3083884"/>
-            <a:ext cx="723569" cy="1388604"/>
+            <a:off x="6954635" y="3257075"/>
+            <a:ext cx="527364" cy="1238428"/>
           </a:xfrm>
           <a:prstGeom prst="curvedConnector2">
             <a:avLst/>
@@ -33245,7 +33267,7 @@
         </p:nvSpPr>
         <p:spPr>
           <a:xfrm>
-            <a:off x="7257056" y="3959198"/>
+            <a:off x="7235022" y="4014283"/>
             <a:ext cx="1346779" cy="369332"/>
           </a:xfrm>
           <a:prstGeom prst="rect">
@@ -33284,8 +33306,8 @@
         </p:nvCxnSpPr>
         <p:spPr>
           <a:xfrm rot="10800000">
-            <a:off x="2687663" y="3492031"/>
-            <a:ext cx="1617007" cy="647940"/>
+            <a:off x="2687662" y="3492031"/>
+            <a:ext cx="1465696" cy="647940"/>
           </a:xfrm>
           <a:prstGeom prst="curvedConnector2">
             <a:avLst/>
@@ -33326,7 +33348,7 @@
         </p:nvSpPr>
         <p:spPr>
           <a:xfrm>
-            <a:off x="2531562" y="4214683"/>
+            <a:off x="2443427" y="4104515"/>
             <a:ext cx="1200970" cy="369332"/>
           </a:xfrm>
           <a:prstGeom prst="rect">

</xml_diff>